<commit_message>
Updated PPT and static files
</commit_message>
<xml_diff>
--- a/Django EdYoda.pptx
+++ b/Django EdYoda.pptx
@@ -90,6 +90,16 @@
     <p:sldId id="339" r:id="rId84"/>
     <p:sldId id="340" r:id="rId85"/>
     <p:sldId id="341" r:id="rId86"/>
+    <p:sldId id="347" r:id="rId87"/>
+    <p:sldId id="342" r:id="rId88"/>
+    <p:sldId id="343" r:id="rId89"/>
+    <p:sldId id="344" r:id="rId90"/>
+    <p:sldId id="345" r:id="rId91"/>
+    <p:sldId id="349" r:id="rId92"/>
+    <p:sldId id="350" r:id="rId93"/>
+    <p:sldId id="351" r:id="rId94"/>
+    <p:sldId id="352" r:id="rId95"/>
+    <p:sldId id="353" r:id="rId96"/>
   </p:sldIdLst>
   <p:sldSz cx="12192000" cy="6858000"/>
   <p:notesSz cx="6858000" cy="9144000"/>
@@ -278,6 +288,16 @@
             <p14:sldId id="339"/>
             <p14:sldId id="340"/>
             <p14:sldId id="341"/>
+            <p14:sldId id="347"/>
+            <p14:sldId id="342"/>
+            <p14:sldId id="343"/>
+            <p14:sldId id="344"/>
+            <p14:sldId id="345"/>
+            <p14:sldId id="349"/>
+            <p14:sldId id="350"/>
+            <p14:sldId id="351"/>
+            <p14:sldId id="352"/>
+            <p14:sldId id="353"/>
           </p14:sldIdLst>
         </p14:section>
       </p14:sectionLst>
@@ -1011,7 +1031,7 @@
           <a:p>
             <a:fld id="{4F21ED49-AE0E-4D00-A253-2186B39C6321}" type="datetimeFigureOut">
               <a:rPr lang="en-IN" smtClean="0"/>
-              <a:t>25-06-2021</a:t>
+              <a:t>29-06-2021</a:t>
             </a:fld>
             <a:endParaRPr lang="en-IN"/>
           </a:p>
@@ -1262,7 +1282,7 @@
           <a:p>
             <a:fld id="{4F21ED49-AE0E-4D00-A253-2186B39C6321}" type="datetimeFigureOut">
               <a:rPr lang="en-IN" smtClean="0"/>
-              <a:t>25-06-2021</a:t>
+              <a:t>29-06-2021</a:t>
             </a:fld>
             <a:endParaRPr lang="en-IN"/>
           </a:p>
@@ -1576,7 +1596,7 @@
           <a:p>
             <a:fld id="{4F21ED49-AE0E-4D00-A253-2186B39C6321}" type="datetimeFigureOut">
               <a:rPr lang="en-IN" smtClean="0"/>
-              <a:t>25-06-2021</a:t>
+              <a:t>29-06-2021</a:t>
             </a:fld>
             <a:endParaRPr lang="en-IN"/>
           </a:p>
@@ -1917,7 +1937,7 @@
           <a:p>
             <a:fld id="{4F21ED49-AE0E-4D00-A253-2186B39C6321}" type="datetimeFigureOut">
               <a:rPr lang="en-IN" smtClean="0"/>
-              <a:t>25-06-2021</a:t>
+              <a:t>29-06-2021</a:t>
             </a:fld>
             <a:endParaRPr lang="en-IN"/>
           </a:p>
@@ -2231,7 +2251,7 @@
           <a:p>
             <a:fld id="{4F21ED49-AE0E-4D00-A253-2186B39C6321}" type="datetimeFigureOut">
               <a:rPr lang="en-IN" smtClean="0"/>
-              <a:t>25-06-2021</a:t>
+              <a:t>29-06-2021</a:t>
             </a:fld>
             <a:endParaRPr lang="en-IN"/>
           </a:p>
@@ -2624,7 +2644,7 @@
           <a:p>
             <a:fld id="{4F21ED49-AE0E-4D00-A253-2186B39C6321}" type="datetimeFigureOut">
               <a:rPr lang="en-IN" smtClean="0"/>
-              <a:t>25-06-2021</a:t>
+              <a:t>29-06-2021</a:t>
             </a:fld>
             <a:endParaRPr lang="en-IN"/>
           </a:p>
@@ -2794,7 +2814,7 @@
           <a:p>
             <a:fld id="{4F21ED49-AE0E-4D00-A253-2186B39C6321}" type="datetimeFigureOut">
               <a:rPr lang="en-IN" smtClean="0"/>
-              <a:t>25-06-2021</a:t>
+              <a:t>29-06-2021</a:t>
             </a:fld>
             <a:endParaRPr lang="en-IN"/>
           </a:p>
@@ -2974,7 +2994,7 @@
           <a:p>
             <a:fld id="{4F21ED49-AE0E-4D00-A253-2186B39C6321}" type="datetimeFigureOut">
               <a:rPr lang="en-IN" smtClean="0"/>
-              <a:t>25-06-2021</a:t>
+              <a:t>29-06-2021</a:t>
             </a:fld>
             <a:endParaRPr lang="en-IN"/>
           </a:p>
@@ -3150,7 +3170,7 @@
           <a:p>
             <a:fld id="{4F21ED49-AE0E-4D00-A253-2186B39C6321}" type="datetimeFigureOut">
               <a:rPr lang="en-IN" smtClean="0"/>
-              <a:t>25-06-2021</a:t>
+              <a:t>29-06-2021</a:t>
             </a:fld>
             <a:endParaRPr lang="en-IN"/>
           </a:p>
@@ -3397,7 +3417,7 @@
           <a:p>
             <a:fld id="{4F21ED49-AE0E-4D00-A253-2186B39C6321}" type="datetimeFigureOut">
               <a:rPr lang="en-IN" smtClean="0"/>
-              <a:t>25-06-2021</a:t>
+              <a:t>29-06-2021</a:t>
             </a:fld>
             <a:endParaRPr lang="en-IN"/>
           </a:p>
@@ -3629,7 +3649,7 @@
           <a:p>
             <a:fld id="{4F21ED49-AE0E-4D00-A253-2186B39C6321}" type="datetimeFigureOut">
               <a:rPr lang="en-IN" smtClean="0"/>
-              <a:t>25-06-2021</a:t>
+              <a:t>29-06-2021</a:t>
             </a:fld>
             <a:endParaRPr lang="en-IN"/>
           </a:p>
@@ -4003,7 +4023,7 @@
           <a:p>
             <a:fld id="{4F21ED49-AE0E-4D00-A253-2186B39C6321}" type="datetimeFigureOut">
               <a:rPr lang="en-IN" smtClean="0"/>
-              <a:t>25-06-2021</a:t>
+              <a:t>29-06-2021</a:t>
             </a:fld>
             <a:endParaRPr lang="en-IN"/>
           </a:p>
@@ -4126,7 +4146,7 @@
           <a:p>
             <a:fld id="{4F21ED49-AE0E-4D00-A253-2186B39C6321}" type="datetimeFigureOut">
               <a:rPr lang="en-IN" smtClean="0"/>
-              <a:t>25-06-2021</a:t>
+              <a:t>29-06-2021</a:t>
             </a:fld>
             <a:endParaRPr lang="en-IN"/>
           </a:p>
@@ -4221,7 +4241,7 @@
           <a:p>
             <a:fld id="{4F21ED49-AE0E-4D00-A253-2186B39C6321}" type="datetimeFigureOut">
               <a:rPr lang="en-IN" smtClean="0"/>
-              <a:t>25-06-2021</a:t>
+              <a:t>29-06-2021</a:t>
             </a:fld>
             <a:endParaRPr lang="en-IN"/>
           </a:p>
@@ -4476,7 +4496,7 @@
           <a:p>
             <a:fld id="{4F21ED49-AE0E-4D00-A253-2186B39C6321}" type="datetimeFigureOut">
               <a:rPr lang="en-IN" smtClean="0"/>
-              <a:t>25-06-2021</a:t>
+              <a:t>29-06-2021</a:t>
             </a:fld>
             <a:endParaRPr lang="en-IN"/>
           </a:p>
@@ -4739,7 +4759,7 @@
           <a:p>
             <a:fld id="{4F21ED49-AE0E-4D00-A253-2186B39C6321}" type="datetimeFigureOut">
               <a:rPr lang="en-IN" smtClean="0"/>
-              <a:t>25-06-2021</a:t>
+              <a:t>29-06-2021</a:t>
             </a:fld>
             <a:endParaRPr lang="en-IN"/>
           </a:p>
@@ -5482,7 +5502,7 @@
           <a:p>
             <a:fld id="{4F21ED49-AE0E-4D00-A253-2186B39C6321}" type="datetimeFigureOut">
               <a:rPr lang="en-IN" smtClean="0"/>
-              <a:t>25-06-2021</a:t>
+              <a:t>29-06-2021</a:t>
             </a:fld>
             <a:endParaRPr lang="en-IN"/>
           </a:p>
@@ -19654,21 +19674,13 @@
           </a:bodyPr>
           <a:lstStyle/>
           <a:p>
-            <a:pPr marL="0" marR="0" lvl="0" indent="0" algn="l" defTabSz="914400" rtl="0" eaLnBrk="0" fontAlgn="base" latinLnBrk="0" hangingPunct="0">
-              <a:lnSpc>
-                <a:spcPct val="100000"/>
-              </a:lnSpc>
+            <a:pPr lvl="0" defTabSz="914400" eaLnBrk="0" fontAlgn="base" hangingPunct="0">
               <a:spcBef>
                 <a:spcPct val="0"/>
               </a:spcBef>
               <a:spcAft>
                 <a:spcPct val="0"/>
               </a:spcAft>
-              <a:buClrTx/>
-              <a:buSzTx/>
-              <a:buFontTx/>
-              <a:buNone/>
-              <a:tabLst/>
             </a:pPr>
             <a:r>
               <a:rPr kumimoji="0" lang="en-US" altLang="en-US" sz="1400" b="0" i="0" u="none" strike="noStrike" cap="none" normalizeH="0" baseline="0" dirty="0" err="1">
@@ -19737,7 +19749,7 @@
                 <a:latin typeface="Courier New" panose="02070309020205020404" pitchFamily="49" charset="0"/>
                 <a:cs typeface="Courier New" panose="02070309020205020404" pitchFamily="49" charset="0"/>
               </a:rPr>
-              <a:t>"&lt;month&gt;"</a:t>
+              <a:t>"&lt;&gt;"</a:t>
             </a:r>
             <a:r>
               <a:rPr kumimoji="0" lang="en-US" altLang="en-US" sz="1400" b="0" i="0" u="none" strike="noStrike" cap="none" normalizeH="0" baseline="0" dirty="0">
@@ -19807,6 +19819,16 @@
                 <a:cs typeface="Courier New" panose="02070309020205020404" pitchFamily="49" charset="0"/>
               </a:rPr>
               <a:t>]</a:t>
+            </a:r>
+            <a:r>
+              <a:rPr lang="en-US" altLang="en-US" sz="1400" b="1" dirty="0">
+                <a:solidFill>
+                  <a:srgbClr val="008080"/>
+                </a:solidFill>
+                <a:latin typeface="Courier New" panose="02070309020205020404" pitchFamily="49" charset="0"/>
+                <a:cs typeface="Courier New" panose="02070309020205020404" pitchFamily="49" charset="0"/>
+              </a:rPr>
+              <a:t> month</a:t>
             </a:r>
             <a:endParaRPr kumimoji="0" lang="en-US" altLang="en-US" sz="1400" b="0" i="0" u="none" strike="noStrike" cap="none" normalizeH="0" baseline="0" dirty="0">
               <a:ln>
@@ -24549,7 +24571,7 @@
           <a:p>
             <a:r>
               <a:rPr lang="en-US" dirty="0"/>
-              <a:t>Django Template Language Features</a:t>
+              <a:t>Django Template Language Features (DLT)</a:t>
             </a:r>
           </a:p>
           <a:p>
@@ -25342,8 +25364,8 @@
         </p:nvSpPr>
         <p:spPr bwMode="auto">
           <a:xfrm>
-            <a:off x="1023457" y="3623921"/>
-            <a:ext cx="5318620" cy="954107"/>
+            <a:off x="1023456" y="3623921"/>
+            <a:ext cx="5746459" cy="954107"/>
           </a:xfrm>
           <a:prstGeom prst="rect">
             <a:avLst/>
@@ -27042,7 +27064,7 @@
         </p:nvSpPr>
         <p:spPr bwMode="auto">
           <a:xfrm>
-            <a:off x="1040235" y="3090446"/>
+            <a:off x="1009755" y="3090446"/>
             <a:ext cx="6014906" cy="338554"/>
           </a:xfrm>
           <a:prstGeom prst="rect">
@@ -29372,6 +29394,539 @@
 </p:sld>
 </file>
 
+<file path=ppt/slides/slide86.xml><?xml version="1.0" encoding="utf-8"?>
+<p:sld xmlns:a="http://schemas.openxmlformats.org/drawingml/2006/main" xmlns:r="http://schemas.openxmlformats.org/officeDocument/2006/relationships" xmlns:p="http://schemas.openxmlformats.org/presentationml/2006/main">
+  <p:cSld>
+    <p:spTree>
+      <p:nvGrpSpPr>
+        <p:cNvPr id="1" name=""/>
+        <p:cNvGrpSpPr/>
+        <p:nvPr/>
+      </p:nvGrpSpPr>
+      <p:grpSpPr>
+        <a:xfrm>
+          <a:off x="0" y="0"/>
+          <a:ext cx="0" cy="0"/>
+          <a:chOff x="0" y="0"/>
+          <a:chExt cx="0" cy="0"/>
+        </a:xfrm>
+      </p:grpSpPr>
+      <p:sp>
+        <p:nvSpPr>
+          <p:cNvPr id="2" name="Title 1">
+            <a:extLst>
+              <a:ext uri="{FF2B5EF4-FFF2-40B4-BE49-F238E27FC236}">
+                <a16:creationId xmlns:a16="http://schemas.microsoft.com/office/drawing/2014/main" id="{8B026E11-AEA3-41CF-B8D0-DA476F1B08FA}"/>
+              </a:ext>
+            </a:extLst>
+          </p:cNvPr>
+          <p:cNvSpPr>
+            <a:spLocks noGrp="1"/>
+          </p:cNvSpPr>
+          <p:nvPr>
+            <p:ph type="ctrTitle"/>
+          </p:nvPr>
+        </p:nvSpPr>
+        <p:spPr/>
+        <p:txBody>
+          <a:bodyPr/>
+          <a:lstStyle/>
+          <a:p>
+            <a:r>
+              <a:rPr lang="en-IN" dirty="0"/>
+              <a:t>Partial Templates and Static Files</a:t>
+            </a:r>
+          </a:p>
+        </p:txBody>
+      </p:sp>
+      <p:sp>
+        <p:nvSpPr>
+          <p:cNvPr id="3" name="Subtitle 2">
+            <a:extLst>
+              <a:ext uri="{FF2B5EF4-FFF2-40B4-BE49-F238E27FC236}">
+                <a16:creationId xmlns:a16="http://schemas.microsoft.com/office/drawing/2014/main" id="{395F5A8B-D933-430B-A5CA-E683C47F3E90}"/>
+              </a:ext>
+            </a:extLst>
+          </p:cNvPr>
+          <p:cNvSpPr>
+            <a:spLocks noGrp="1"/>
+          </p:cNvSpPr>
+          <p:nvPr>
+            <p:ph type="subTitle" idx="1"/>
+          </p:nvPr>
+        </p:nvSpPr>
+        <p:spPr>
+          <a:xfrm>
+            <a:off x="1507067" y="4050833"/>
+            <a:ext cx="7766936" cy="1720793"/>
+          </a:xfrm>
+        </p:spPr>
+        <p:txBody>
+          <a:bodyPr>
+            <a:normAutofit fontScale="92500" lnSpcReduction="20000"/>
+          </a:bodyPr>
+          <a:lstStyle/>
+          <a:p>
+            <a:pPr>
+              <a:buFont typeface="Arial" panose="020B0604020202020204" pitchFamily="34" charset="0"/>
+              <a:buChar char="•"/>
+            </a:pPr>
+            <a:r>
+              <a:rPr lang="en-US" b="0" i="0" dirty="0">
+                <a:solidFill>
+                  <a:srgbClr val="000000"/>
+                </a:solidFill>
+                <a:effectLst/>
+                <a:latin typeface="Roboto" panose="02000000000000000000" pitchFamily="2" charset="0"/>
+              </a:rPr>
+              <a:t>Partial Templates</a:t>
+            </a:r>
+          </a:p>
+          <a:p>
+            <a:pPr>
+              <a:buFont typeface="Arial" panose="020B0604020202020204" pitchFamily="34" charset="0"/>
+              <a:buChar char="•"/>
+            </a:pPr>
+            <a:r>
+              <a:rPr lang="en-US" b="0" i="0" dirty="0">
+                <a:solidFill>
+                  <a:srgbClr val="000000"/>
+                </a:solidFill>
+                <a:effectLst/>
+                <a:latin typeface="Roboto" panose="02000000000000000000" pitchFamily="2" charset="0"/>
+              </a:rPr>
+              <a:t>Static Files</a:t>
+            </a:r>
+          </a:p>
+          <a:p>
+            <a:pPr>
+              <a:buFont typeface="Arial" panose="020B0604020202020204" pitchFamily="34" charset="0"/>
+              <a:buChar char="•"/>
+            </a:pPr>
+            <a:r>
+              <a:rPr lang="en-US" b="0" i="0" dirty="0">
+                <a:solidFill>
+                  <a:srgbClr val="000000"/>
+                </a:solidFill>
+                <a:effectLst/>
+                <a:latin typeface="Roboto" panose="02000000000000000000" pitchFamily="2" charset="0"/>
+              </a:rPr>
+              <a:t>Configuring Static Files</a:t>
+            </a:r>
+          </a:p>
+          <a:p>
+            <a:pPr>
+              <a:buFont typeface="Arial" panose="020B0604020202020204" pitchFamily="34" charset="0"/>
+              <a:buChar char="•"/>
+            </a:pPr>
+            <a:r>
+              <a:rPr lang="en-US" b="0" i="0" dirty="0">
+                <a:solidFill>
+                  <a:srgbClr val="000000"/>
+                </a:solidFill>
+                <a:effectLst/>
+                <a:latin typeface="Roboto" panose="02000000000000000000" pitchFamily="2" charset="0"/>
+              </a:rPr>
+              <a:t>Serving Static File in Development</a:t>
+            </a:r>
+          </a:p>
+          <a:p>
+            <a:pPr>
+              <a:buFont typeface="Arial" panose="020B0604020202020204" pitchFamily="34" charset="0"/>
+              <a:buChar char="•"/>
+            </a:pPr>
+            <a:r>
+              <a:rPr lang="en-US" dirty="0">
+                <a:solidFill>
+                  <a:srgbClr val="000000"/>
+                </a:solidFill>
+                <a:latin typeface="Roboto" panose="02000000000000000000" pitchFamily="2" charset="0"/>
+              </a:rPr>
+              <a:t>Handling 404 Responses</a:t>
+            </a:r>
+            <a:endParaRPr lang="en-US" b="0" i="0" dirty="0">
+              <a:solidFill>
+                <a:srgbClr val="000000"/>
+              </a:solidFill>
+              <a:effectLst/>
+              <a:latin typeface="Roboto" panose="02000000000000000000" pitchFamily="2" charset="0"/>
+            </a:endParaRPr>
+          </a:p>
+          <a:p>
+            <a:pPr algn="l"/>
+            <a:endParaRPr lang="en-US" b="0" i="0" dirty="0">
+              <a:solidFill>
+                <a:srgbClr val="000000"/>
+              </a:solidFill>
+              <a:effectLst/>
+              <a:latin typeface="Roboto" panose="02000000000000000000" pitchFamily="2" charset="0"/>
+            </a:endParaRPr>
+          </a:p>
+          <a:p>
+            <a:endParaRPr lang="en-IN" dirty="0"/>
+          </a:p>
+        </p:txBody>
+      </p:sp>
+    </p:spTree>
+    <p:extLst>
+      <p:ext uri="{BB962C8B-B14F-4D97-AF65-F5344CB8AC3E}">
+        <p14:creationId xmlns:p14="http://schemas.microsoft.com/office/powerpoint/2010/main" val="986613971"/>
+      </p:ext>
+    </p:extLst>
+  </p:cSld>
+  <p:clrMapOvr>
+    <a:masterClrMapping/>
+  </p:clrMapOvr>
+</p:sld>
+</file>
+
+<file path=ppt/slides/slide87.xml><?xml version="1.0" encoding="utf-8"?>
+<p:sld xmlns:a="http://schemas.openxmlformats.org/drawingml/2006/main" xmlns:r="http://schemas.openxmlformats.org/officeDocument/2006/relationships" xmlns:p="http://schemas.openxmlformats.org/presentationml/2006/main">
+  <p:cSld>
+    <p:spTree>
+      <p:nvGrpSpPr>
+        <p:cNvPr id="1" name=""/>
+        <p:cNvGrpSpPr/>
+        <p:nvPr/>
+      </p:nvGrpSpPr>
+      <p:grpSpPr>
+        <a:xfrm>
+          <a:off x="0" y="0"/>
+          <a:ext cx="0" cy="0"/>
+          <a:chOff x="0" y="0"/>
+          <a:chExt cx="0" cy="0"/>
+        </a:xfrm>
+      </p:grpSpPr>
+      <p:sp>
+        <p:nvSpPr>
+          <p:cNvPr id="2" name="Title 1">
+            <a:extLst>
+              <a:ext uri="{FF2B5EF4-FFF2-40B4-BE49-F238E27FC236}">
+                <a16:creationId xmlns:a16="http://schemas.microsoft.com/office/drawing/2014/main" id="{750CAEF1-C1E9-42D5-9B2E-690B21CFB521}"/>
+              </a:ext>
+            </a:extLst>
+          </p:cNvPr>
+          <p:cNvSpPr>
+            <a:spLocks noGrp="1"/>
+          </p:cNvSpPr>
+          <p:nvPr>
+            <p:ph type="title"/>
+          </p:nvPr>
+        </p:nvSpPr>
+        <p:spPr/>
+        <p:txBody>
+          <a:bodyPr/>
+          <a:lstStyle/>
+          <a:p>
+            <a:r>
+              <a:rPr lang="en-IN" dirty="0"/>
+              <a:t>Partial Template Snippet and include tag</a:t>
+            </a:r>
+          </a:p>
+        </p:txBody>
+      </p:sp>
+      <p:sp>
+        <p:nvSpPr>
+          <p:cNvPr id="3" name="Content Placeholder 2">
+            <a:extLst>
+              <a:ext uri="{FF2B5EF4-FFF2-40B4-BE49-F238E27FC236}">
+                <a16:creationId xmlns:a16="http://schemas.microsoft.com/office/drawing/2014/main" id="{7D66D214-D46C-46FC-A8C9-A503ACCF775A}"/>
+              </a:ext>
+            </a:extLst>
+          </p:cNvPr>
+          <p:cNvSpPr>
+            <a:spLocks noGrp="1"/>
+          </p:cNvSpPr>
+          <p:nvPr>
+            <p:ph idx="1"/>
+          </p:nvPr>
+        </p:nvSpPr>
+        <p:spPr/>
+        <p:txBody>
+          <a:bodyPr/>
+          <a:lstStyle/>
+          <a:p>
+            <a:r>
+              <a:rPr lang="en-IN" dirty="0"/>
+              <a:t>Generate common HTML snippets that can be used by the templates</a:t>
+            </a:r>
+          </a:p>
+          <a:p>
+            <a:r>
+              <a:rPr lang="en-IN" dirty="0"/>
+              <a:t>{% include ‘</a:t>
+            </a:r>
+            <a:r>
+              <a:rPr lang="en-IN" dirty="0" err="1"/>
+              <a:t>templatename</a:t>
+            </a:r>
+            <a:r>
+              <a:rPr lang="en-IN" dirty="0"/>
+              <a:t>’%}</a:t>
+            </a:r>
+          </a:p>
+          <a:p>
+            <a:r>
+              <a:rPr lang="en-IN" dirty="0"/>
+              <a:t>To send variables across use the following</a:t>
+            </a:r>
+          </a:p>
+          <a:p>
+            <a:r>
+              <a:rPr lang="en-IN" dirty="0"/>
+              <a:t>{% include ‘template name’ with </a:t>
+            </a:r>
+            <a:r>
+              <a:rPr lang="en-IN" dirty="0" err="1"/>
+              <a:t>variable_name</a:t>
+            </a:r>
+            <a:r>
+              <a:rPr lang="en-IN" dirty="0"/>
+              <a:t>=‘Data’ %}</a:t>
+            </a:r>
+          </a:p>
+        </p:txBody>
+      </p:sp>
+    </p:spTree>
+    <p:extLst>
+      <p:ext uri="{BB962C8B-B14F-4D97-AF65-F5344CB8AC3E}">
+        <p14:creationId xmlns:p14="http://schemas.microsoft.com/office/powerpoint/2010/main" val="2282814224"/>
+      </p:ext>
+    </p:extLst>
+  </p:cSld>
+  <p:clrMapOvr>
+    <a:masterClrMapping/>
+  </p:clrMapOvr>
+</p:sld>
+</file>
+
+<file path=ppt/slides/slide88.xml><?xml version="1.0" encoding="utf-8"?>
+<p:sld xmlns:a="http://schemas.openxmlformats.org/drawingml/2006/main" xmlns:r="http://schemas.openxmlformats.org/officeDocument/2006/relationships" xmlns:p="http://schemas.openxmlformats.org/presentationml/2006/main">
+  <p:cSld>
+    <p:spTree>
+      <p:nvGrpSpPr>
+        <p:cNvPr id="1" name=""/>
+        <p:cNvGrpSpPr/>
+        <p:nvPr/>
+      </p:nvGrpSpPr>
+      <p:grpSpPr>
+        <a:xfrm>
+          <a:off x="0" y="0"/>
+          <a:ext cx="0" cy="0"/>
+          <a:chOff x="0" y="0"/>
+          <a:chExt cx="0" cy="0"/>
+        </a:xfrm>
+      </p:grpSpPr>
+      <p:sp>
+        <p:nvSpPr>
+          <p:cNvPr id="2" name="Title 1">
+            <a:extLst>
+              <a:ext uri="{FF2B5EF4-FFF2-40B4-BE49-F238E27FC236}">
+                <a16:creationId xmlns:a16="http://schemas.microsoft.com/office/drawing/2014/main" id="{B95AF5CE-248C-498B-BA97-82492D8BB10F}"/>
+              </a:ext>
+            </a:extLst>
+          </p:cNvPr>
+          <p:cNvSpPr>
+            <a:spLocks noGrp="1"/>
+          </p:cNvSpPr>
+          <p:nvPr>
+            <p:ph type="title"/>
+          </p:nvPr>
+        </p:nvSpPr>
+        <p:spPr/>
+        <p:txBody>
+          <a:bodyPr/>
+          <a:lstStyle/>
+          <a:p>
+            <a:r>
+              <a:rPr lang="en-IN" dirty="0"/>
+              <a:t>404 Templates</a:t>
+            </a:r>
+          </a:p>
+        </p:txBody>
+      </p:sp>
+      <p:sp>
+        <p:nvSpPr>
+          <p:cNvPr id="3" name="Content Placeholder 2">
+            <a:extLst>
+              <a:ext uri="{FF2B5EF4-FFF2-40B4-BE49-F238E27FC236}">
+                <a16:creationId xmlns:a16="http://schemas.microsoft.com/office/drawing/2014/main" id="{120AC4A6-1048-4AC5-ACD7-BB7982267540}"/>
+              </a:ext>
+            </a:extLst>
+          </p:cNvPr>
+          <p:cNvSpPr>
+            <a:spLocks noGrp="1"/>
+          </p:cNvSpPr>
+          <p:nvPr>
+            <p:ph idx="1"/>
+          </p:nvPr>
+        </p:nvSpPr>
+        <p:spPr/>
+        <p:txBody>
+          <a:bodyPr/>
+          <a:lstStyle/>
+          <a:p>
+            <a:r>
+              <a:rPr lang="en-IN" dirty="0"/>
+              <a:t>For this cannot use render shortcut as that always returns the successful messages.</a:t>
+            </a:r>
+          </a:p>
+          <a:p>
+            <a:r>
+              <a:rPr lang="en-IN" dirty="0"/>
+              <a:t>Http404 Class</a:t>
+            </a:r>
+          </a:p>
+          <a:p>
+            <a:r>
+              <a:rPr lang="en-IN" dirty="0"/>
+              <a:t>We need to raise the error Class </a:t>
+            </a:r>
+          </a:p>
+          <a:p>
+            <a:pPr lvl="1"/>
+            <a:r>
+              <a:rPr lang="en-IN" dirty="0"/>
+              <a:t>Raise Http404()</a:t>
+            </a:r>
+          </a:p>
+          <a:p>
+            <a:r>
+              <a:rPr lang="en-IN" dirty="0"/>
+              <a:t>This would look for 404.html page</a:t>
+            </a:r>
+          </a:p>
+        </p:txBody>
+      </p:sp>
+    </p:spTree>
+    <p:extLst>
+      <p:ext uri="{BB962C8B-B14F-4D97-AF65-F5344CB8AC3E}">
+        <p14:creationId xmlns:p14="http://schemas.microsoft.com/office/powerpoint/2010/main" val="2435658049"/>
+      </p:ext>
+    </p:extLst>
+  </p:cSld>
+  <p:clrMapOvr>
+    <a:masterClrMapping/>
+  </p:clrMapOvr>
+</p:sld>
+</file>
+
+<file path=ppt/slides/slide89.xml><?xml version="1.0" encoding="utf-8"?>
+<p:sld xmlns:a="http://schemas.openxmlformats.org/drawingml/2006/main" xmlns:r="http://schemas.openxmlformats.org/officeDocument/2006/relationships" xmlns:p="http://schemas.openxmlformats.org/presentationml/2006/main">
+  <p:cSld>
+    <p:spTree>
+      <p:nvGrpSpPr>
+        <p:cNvPr id="1" name=""/>
+        <p:cNvGrpSpPr/>
+        <p:nvPr/>
+      </p:nvGrpSpPr>
+      <p:grpSpPr>
+        <a:xfrm>
+          <a:off x="0" y="0"/>
+          <a:ext cx="0" cy="0"/>
+          <a:chOff x="0" y="0"/>
+          <a:chExt cx="0" cy="0"/>
+        </a:xfrm>
+      </p:grpSpPr>
+      <p:sp>
+        <p:nvSpPr>
+          <p:cNvPr id="2" name="Title 1">
+            <a:extLst>
+              <a:ext uri="{FF2B5EF4-FFF2-40B4-BE49-F238E27FC236}">
+                <a16:creationId xmlns:a16="http://schemas.microsoft.com/office/drawing/2014/main" id="{FF6C75C4-8283-423A-A219-74450C548E10}"/>
+              </a:ext>
+            </a:extLst>
+          </p:cNvPr>
+          <p:cNvSpPr>
+            <a:spLocks noGrp="1"/>
+          </p:cNvSpPr>
+          <p:nvPr>
+            <p:ph type="title"/>
+          </p:nvPr>
+        </p:nvSpPr>
+        <p:spPr/>
+        <p:txBody>
+          <a:bodyPr/>
+          <a:lstStyle/>
+          <a:p>
+            <a:r>
+              <a:rPr lang="en-IN" dirty="0"/>
+              <a:t>Manage Static Files</a:t>
+            </a:r>
+          </a:p>
+        </p:txBody>
+      </p:sp>
+      <p:sp>
+        <p:nvSpPr>
+          <p:cNvPr id="3" name="Content Placeholder 2">
+            <a:extLst>
+              <a:ext uri="{FF2B5EF4-FFF2-40B4-BE49-F238E27FC236}">
+                <a16:creationId xmlns:a16="http://schemas.microsoft.com/office/drawing/2014/main" id="{687F4BAC-E7DF-45AF-A278-15A622AE2ECD}"/>
+              </a:ext>
+            </a:extLst>
+          </p:cNvPr>
+          <p:cNvSpPr>
+            <a:spLocks noGrp="1"/>
+          </p:cNvSpPr>
+          <p:nvPr>
+            <p:ph idx="1"/>
+          </p:nvPr>
+        </p:nvSpPr>
+        <p:spPr/>
+        <p:txBody>
+          <a:bodyPr/>
+          <a:lstStyle/>
+          <a:p>
+            <a:r>
+              <a:rPr lang="en-IN" dirty="0"/>
+              <a:t>Basically not manipulated by server</a:t>
+            </a:r>
+          </a:p>
+          <a:p>
+            <a:r>
+              <a:rPr lang="en-IN" dirty="0"/>
+              <a:t>The content is not changed by the server</a:t>
+            </a:r>
+          </a:p>
+          <a:p>
+            <a:pPr lvl="1"/>
+            <a:r>
+              <a:rPr lang="en-IN" dirty="0" err="1"/>
+              <a:t>Eg</a:t>
+            </a:r>
+            <a:r>
+              <a:rPr lang="en-IN" dirty="0"/>
+              <a:t>: CSS, JS etc</a:t>
+            </a:r>
+          </a:p>
+          <a:p>
+            <a:r>
+              <a:rPr lang="en-IN" dirty="0"/>
+              <a:t>Create static folder</a:t>
+            </a:r>
+          </a:p>
+          <a:p>
+            <a:pPr lvl="1"/>
+            <a:r>
+              <a:rPr lang="en-IN" dirty="0"/>
+              <a:t>Create folder named app</a:t>
+            </a:r>
+          </a:p>
+        </p:txBody>
+      </p:sp>
+    </p:spTree>
+    <p:extLst>
+      <p:ext uri="{BB962C8B-B14F-4D97-AF65-F5344CB8AC3E}">
+        <p14:creationId xmlns:p14="http://schemas.microsoft.com/office/powerpoint/2010/main" val="2217969830"/>
+      </p:ext>
+    </p:extLst>
+  </p:cSld>
+  <p:clrMapOvr>
+    <a:masterClrMapping/>
+  </p:clrMapOvr>
+</p:sld>
+</file>
+
 <file path=ppt/slides/slide9.xml><?xml version="1.0" encoding="utf-8"?>
 <p:sld xmlns:a="http://schemas.openxmlformats.org/drawingml/2006/main" xmlns:r="http://schemas.openxmlformats.org/officeDocument/2006/relationships" xmlns:p="http://schemas.openxmlformats.org/presentationml/2006/main">
   <p:cSld>
@@ -29581,6 +30136,977 @@
     <p:extLst>
       <p:ext uri="{BB962C8B-B14F-4D97-AF65-F5344CB8AC3E}">
         <p14:creationId xmlns:p14="http://schemas.microsoft.com/office/powerpoint/2010/main" val="3297550754"/>
+      </p:ext>
+    </p:extLst>
+  </p:cSld>
+  <p:clrMapOvr>
+    <a:masterClrMapping/>
+  </p:clrMapOvr>
+</p:sld>
+</file>
+
+<file path=ppt/slides/slide90.xml><?xml version="1.0" encoding="utf-8"?>
+<p:sld xmlns:a="http://schemas.openxmlformats.org/drawingml/2006/main" xmlns:r="http://schemas.openxmlformats.org/officeDocument/2006/relationships" xmlns:p="http://schemas.openxmlformats.org/presentationml/2006/main">
+  <p:cSld>
+    <p:spTree>
+      <p:nvGrpSpPr>
+        <p:cNvPr id="1" name=""/>
+        <p:cNvGrpSpPr/>
+        <p:nvPr/>
+      </p:nvGrpSpPr>
+      <p:grpSpPr>
+        <a:xfrm>
+          <a:off x="0" y="0"/>
+          <a:ext cx="0" cy="0"/>
+          <a:chOff x="0" y="0"/>
+          <a:chExt cx="0" cy="0"/>
+        </a:xfrm>
+      </p:grpSpPr>
+      <p:sp>
+        <p:nvSpPr>
+          <p:cNvPr id="2" name="Title 1">
+            <a:extLst>
+              <a:ext uri="{FF2B5EF4-FFF2-40B4-BE49-F238E27FC236}">
+                <a16:creationId xmlns:a16="http://schemas.microsoft.com/office/drawing/2014/main" id="{75ACFAD1-08F0-43E9-A668-806B2DFC9CF9}"/>
+              </a:ext>
+            </a:extLst>
+          </p:cNvPr>
+          <p:cNvSpPr>
+            <a:spLocks noGrp="1"/>
+          </p:cNvSpPr>
+          <p:nvPr>
+            <p:ph type="title"/>
+          </p:nvPr>
+        </p:nvSpPr>
+        <p:spPr/>
+        <p:txBody>
+          <a:bodyPr/>
+          <a:lstStyle/>
+          <a:p>
+            <a:r>
+              <a:rPr lang="en-IN" dirty="0"/>
+              <a:t>Configure static files</a:t>
+            </a:r>
+          </a:p>
+        </p:txBody>
+      </p:sp>
+      <p:sp>
+        <p:nvSpPr>
+          <p:cNvPr id="3" name="Content Placeholder 2">
+            <a:extLst>
+              <a:ext uri="{FF2B5EF4-FFF2-40B4-BE49-F238E27FC236}">
+                <a16:creationId xmlns:a16="http://schemas.microsoft.com/office/drawing/2014/main" id="{ED49B9B0-A3D2-498D-B8DE-6952356F9723}"/>
+              </a:ext>
+            </a:extLst>
+          </p:cNvPr>
+          <p:cNvSpPr>
+            <a:spLocks noGrp="1"/>
+          </p:cNvSpPr>
+          <p:nvPr>
+            <p:ph idx="1"/>
+          </p:nvPr>
+        </p:nvSpPr>
+        <p:spPr/>
+        <p:txBody>
+          <a:bodyPr/>
+          <a:lstStyle/>
+          <a:p>
+            <a:r>
+              <a:rPr lang="en-IN" dirty="0"/>
+              <a:t>Check for </a:t>
+            </a:r>
+            <a:r>
+              <a:rPr lang="en-IN" dirty="0" err="1"/>
+              <a:t>Django.contrib.staticfiles</a:t>
+            </a:r>
+            <a:r>
+              <a:rPr lang="en-IN" dirty="0"/>
+              <a:t> in INSTALLED_APPS in settings.py, it should be there by default</a:t>
+            </a:r>
+          </a:p>
+          <a:p>
+            <a:r>
+              <a:rPr lang="en-IN" dirty="0"/>
+              <a:t>Load static files</a:t>
+            </a:r>
+          </a:p>
+          <a:p>
+            <a:r>
+              <a:rPr lang="en-IN" dirty="0"/>
+              <a:t>{% load static %}</a:t>
+            </a:r>
+          </a:p>
+          <a:p>
+            <a:r>
+              <a:rPr lang="en-IN" dirty="0"/>
+              <a:t>Load(re-run) the application after adding static files</a:t>
+            </a:r>
+          </a:p>
+          <a:p>
+            <a:r>
+              <a:rPr lang="en-IN" dirty="0"/>
+              <a:t>Static files are generally picked up by Django from app folder</a:t>
+            </a:r>
+          </a:p>
+          <a:p>
+            <a:r>
+              <a:rPr lang="en-IN" dirty="0"/>
+              <a:t>To give a path to a new/common static do the following in settins.py</a:t>
+            </a:r>
+          </a:p>
+        </p:txBody>
+      </p:sp>
+      <p:sp>
+        <p:nvSpPr>
+          <p:cNvPr id="4" name="Rectangle 1">
+            <a:extLst>
+              <a:ext uri="{FF2B5EF4-FFF2-40B4-BE49-F238E27FC236}">
+                <a16:creationId xmlns:a16="http://schemas.microsoft.com/office/drawing/2014/main" id="{77A84E56-EFFC-41E6-8B20-BEEC1B5F4AE3}"/>
+              </a:ext>
+            </a:extLst>
+          </p:cNvPr>
+          <p:cNvSpPr>
+            <a:spLocks noChangeArrowheads="1"/>
+          </p:cNvSpPr>
+          <p:nvPr/>
+        </p:nvSpPr>
+        <p:spPr bwMode="auto">
+          <a:xfrm>
+            <a:off x="1107347" y="4832982"/>
+            <a:ext cx="7357145" cy="830997"/>
+          </a:xfrm>
+          <a:prstGeom prst="rect">
+            <a:avLst/>
+          </a:prstGeom>
+          <a:solidFill>
+            <a:srgbClr val="FFFFFF"/>
+          </a:solidFill>
+          <a:ln>
+            <a:noFill/>
+          </a:ln>
+          <a:effectLst/>
+          <a:extLst>
+            <a:ext uri="{91240B29-F687-4F45-9708-019B960494DF}">
+              <a14:hiddenLine xmlns:a14="http://schemas.microsoft.com/office/drawing/2010/main" w="9525">
+                <a:solidFill>
+                  <a:schemeClr val="tx1"/>
+                </a:solidFill>
+                <a:miter lim="800000"/>
+                <a:headEnd/>
+                <a:tailEnd/>
+              </a14:hiddenLine>
+            </a:ext>
+            <a:ext uri="{AF507438-7753-43E0-B8FC-AC1667EBCBE1}">
+              <a14:hiddenEffects xmlns:a14="http://schemas.microsoft.com/office/drawing/2010/main">
+                <a:effectLst>
+                  <a:outerShdw dist="35921" dir="2700000" algn="ctr" rotWithShape="0">
+                    <a:schemeClr val="bg2"/>
+                  </a:outerShdw>
+                </a:effectLst>
+              </a14:hiddenEffects>
+            </a:ext>
+          </a:extLst>
+        </p:spPr>
+        <p:txBody>
+          <a:bodyPr vert="horz" wrap="square" lIns="91440" tIns="45720" rIns="91440" bIns="45720" numCol="1" anchor="ctr" anchorCtr="0" compatLnSpc="1">
+            <a:prstTxWarp prst="textNoShape">
+              <a:avLst/>
+            </a:prstTxWarp>
+            <a:spAutoFit/>
+          </a:bodyPr>
+          <a:lstStyle/>
+          <a:p>
+            <a:pPr marL="0" marR="0" lvl="0" indent="0" algn="l" defTabSz="914400" rtl="0" eaLnBrk="0" fontAlgn="base" latinLnBrk="0" hangingPunct="0">
+              <a:lnSpc>
+                <a:spcPct val="100000"/>
+              </a:lnSpc>
+              <a:spcBef>
+                <a:spcPct val="0"/>
+              </a:spcBef>
+              <a:spcAft>
+                <a:spcPct val="0"/>
+              </a:spcAft>
+              <a:buClrTx/>
+              <a:buSzTx/>
+              <a:buFontTx/>
+              <a:buNone/>
+              <a:tabLst/>
+            </a:pPr>
+            <a:r>
+              <a:rPr kumimoji="0" lang="en-US" altLang="en-US" sz="1600" b="0" i="0" u="none" strike="noStrike" cap="none" normalizeH="0" baseline="0" dirty="0">
+                <a:ln>
+                  <a:noFill/>
+                </a:ln>
+                <a:solidFill>
+                  <a:srgbClr val="000000"/>
+                </a:solidFill>
+                <a:effectLst/>
+                <a:latin typeface="JetBrains Mono"/>
+              </a:rPr>
+              <a:t>STATICFILES_DIRS = [</a:t>
+            </a:r>
+            <a:br>
+              <a:rPr kumimoji="0" lang="en-US" altLang="en-US" sz="1600" b="0" i="0" u="none" strike="noStrike" cap="none" normalizeH="0" baseline="0" dirty="0">
+                <a:ln>
+                  <a:noFill/>
+                </a:ln>
+                <a:solidFill>
+                  <a:srgbClr val="000000"/>
+                </a:solidFill>
+                <a:effectLst/>
+                <a:latin typeface="JetBrains Mono"/>
+              </a:rPr>
+            </a:br>
+            <a:r>
+              <a:rPr kumimoji="0" lang="en-US" altLang="en-US" sz="1600" b="0" i="0" u="none" strike="noStrike" cap="none" normalizeH="0" baseline="0" dirty="0">
+                <a:ln>
+                  <a:noFill/>
+                </a:ln>
+                <a:solidFill>
+                  <a:srgbClr val="000000"/>
+                </a:solidFill>
+                <a:effectLst/>
+                <a:latin typeface="JetBrains Mono"/>
+              </a:rPr>
+              <a:t>    BASE_DIR / </a:t>
+            </a:r>
+            <a:r>
+              <a:rPr kumimoji="0" lang="en-US" altLang="en-US" sz="1600" b="1" i="0" u="none" strike="noStrike" cap="none" normalizeH="0" baseline="0" dirty="0">
+                <a:ln>
+                  <a:noFill/>
+                </a:ln>
+                <a:solidFill>
+                  <a:srgbClr val="008080"/>
+                </a:solidFill>
+                <a:effectLst/>
+                <a:latin typeface="JetBrains Mono"/>
+              </a:rPr>
+              <a:t>"static"</a:t>
+            </a:r>
+            <a:br>
+              <a:rPr kumimoji="0" lang="en-US" altLang="en-US" sz="1600" b="1" i="0" u="none" strike="noStrike" cap="none" normalizeH="0" baseline="0" dirty="0">
+                <a:ln>
+                  <a:noFill/>
+                </a:ln>
+                <a:solidFill>
+                  <a:srgbClr val="008080"/>
+                </a:solidFill>
+                <a:effectLst/>
+                <a:latin typeface="JetBrains Mono"/>
+              </a:rPr>
+            </a:br>
+            <a:r>
+              <a:rPr kumimoji="0" lang="en-US" altLang="en-US" sz="1600" b="0" i="0" u="none" strike="noStrike" cap="none" normalizeH="0" baseline="0" dirty="0">
+                <a:ln>
+                  <a:noFill/>
+                </a:ln>
+                <a:solidFill>
+                  <a:srgbClr val="000000"/>
+                </a:solidFill>
+                <a:effectLst/>
+                <a:latin typeface="JetBrains Mono"/>
+              </a:rPr>
+              <a:t>]</a:t>
+            </a:r>
+            <a:endParaRPr kumimoji="0" lang="en-US" altLang="en-US" sz="1600" b="0" i="0" u="none" strike="noStrike" cap="none" normalizeH="0" baseline="0" dirty="0">
+              <a:ln>
+                <a:noFill/>
+              </a:ln>
+              <a:solidFill>
+                <a:schemeClr val="tx1"/>
+              </a:solidFill>
+              <a:effectLst/>
+              <a:latin typeface="Arial" panose="020B0604020202020204" pitchFamily="34" charset="0"/>
+            </a:endParaRPr>
+          </a:p>
+        </p:txBody>
+      </p:sp>
+    </p:spTree>
+    <p:extLst>
+      <p:ext uri="{BB962C8B-B14F-4D97-AF65-F5344CB8AC3E}">
+        <p14:creationId xmlns:p14="http://schemas.microsoft.com/office/powerpoint/2010/main" val="3046396566"/>
+      </p:ext>
+    </p:extLst>
+  </p:cSld>
+  <p:clrMapOvr>
+    <a:masterClrMapping/>
+  </p:clrMapOvr>
+</p:sld>
+</file>
+
+<file path=ppt/slides/slide91.xml><?xml version="1.0" encoding="utf-8"?>
+<p:sld xmlns:a="http://schemas.openxmlformats.org/drawingml/2006/main" xmlns:r="http://schemas.openxmlformats.org/officeDocument/2006/relationships" xmlns:p="http://schemas.openxmlformats.org/presentationml/2006/main">
+  <p:cSld>
+    <p:spTree>
+      <p:nvGrpSpPr>
+        <p:cNvPr id="1" name=""/>
+        <p:cNvGrpSpPr/>
+        <p:nvPr/>
+      </p:nvGrpSpPr>
+      <p:grpSpPr>
+        <a:xfrm>
+          <a:off x="0" y="0"/>
+          <a:ext cx="0" cy="0"/>
+          <a:chOff x="0" y="0"/>
+          <a:chExt cx="0" cy="0"/>
+        </a:xfrm>
+      </p:grpSpPr>
+      <p:sp>
+        <p:nvSpPr>
+          <p:cNvPr id="2" name="Title 1">
+            <a:extLst>
+              <a:ext uri="{FF2B5EF4-FFF2-40B4-BE49-F238E27FC236}">
+                <a16:creationId xmlns:a16="http://schemas.microsoft.com/office/drawing/2014/main" id="{7A4809B8-77BB-43C5-B521-B6A4F328DFF7}"/>
+              </a:ext>
+            </a:extLst>
+          </p:cNvPr>
+          <p:cNvSpPr>
+            <a:spLocks noGrp="1"/>
+          </p:cNvSpPr>
+          <p:nvPr>
+            <p:ph type="ctrTitle"/>
+          </p:nvPr>
+        </p:nvSpPr>
+        <p:spPr/>
+        <p:txBody>
+          <a:bodyPr/>
+          <a:lstStyle/>
+          <a:p>
+            <a:r>
+              <a:rPr lang="en-IN" dirty="0"/>
+              <a:t>Blog : Assignment</a:t>
+            </a:r>
+          </a:p>
+        </p:txBody>
+      </p:sp>
+      <p:sp>
+        <p:nvSpPr>
+          <p:cNvPr id="3" name="Subtitle 2">
+            <a:extLst>
+              <a:ext uri="{FF2B5EF4-FFF2-40B4-BE49-F238E27FC236}">
+                <a16:creationId xmlns:a16="http://schemas.microsoft.com/office/drawing/2014/main" id="{6B098F0B-9F00-4961-9FFF-1641A820A0F0}"/>
+              </a:ext>
+            </a:extLst>
+          </p:cNvPr>
+          <p:cNvSpPr>
+            <a:spLocks noGrp="1"/>
+          </p:cNvSpPr>
+          <p:nvPr>
+            <p:ph type="subTitle" idx="1"/>
+          </p:nvPr>
+        </p:nvSpPr>
+        <p:spPr/>
+        <p:txBody>
+          <a:bodyPr/>
+          <a:lstStyle/>
+          <a:p>
+            <a:endParaRPr lang="en-IN"/>
+          </a:p>
+        </p:txBody>
+      </p:sp>
+    </p:spTree>
+    <p:extLst>
+      <p:ext uri="{BB962C8B-B14F-4D97-AF65-F5344CB8AC3E}">
+        <p14:creationId xmlns:p14="http://schemas.microsoft.com/office/powerpoint/2010/main" val="3601038213"/>
+      </p:ext>
+    </p:extLst>
+  </p:cSld>
+  <p:clrMapOvr>
+    <a:masterClrMapping/>
+  </p:clrMapOvr>
+</p:sld>
+</file>
+
+<file path=ppt/slides/slide92.xml><?xml version="1.0" encoding="utf-8"?>
+<p:sld xmlns:a="http://schemas.openxmlformats.org/drawingml/2006/main" xmlns:r="http://schemas.openxmlformats.org/officeDocument/2006/relationships" xmlns:p="http://schemas.openxmlformats.org/presentationml/2006/main">
+  <p:cSld>
+    <p:spTree>
+      <p:nvGrpSpPr>
+        <p:cNvPr id="1" name=""/>
+        <p:cNvGrpSpPr/>
+        <p:nvPr/>
+      </p:nvGrpSpPr>
+      <p:grpSpPr>
+        <a:xfrm>
+          <a:off x="0" y="0"/>
+          <a:ext cx="0" cy="0"/>
+          <a:chOff x="0" y="0"/>
+          <a:chExt cx="0" cy="0"/>
+        </a:xfrm>
+      </p:grpSpPr>
+      <p:sp>
+        <p:nvSpPr>
+          <p:cNvPr id="2" name="Title 1">
+            <a:extLst>
+              <a:ext uri="{FF2B5EF4-FFF2-40B4-BE49-F238E27FC236}">
+                <a16:creationId xmlns:a16="http://schemas.microsoft.com/office/drawing/2014/main" id="{9DAA461F-F837-492D-BC4C-CEF17312814A}"/>
+              </a:ext>
+            </a:extLst>
+          </p:cNvPr>
+          <p:cNvSpPr>
+            <a:spLocks noGrp="1"/>
+          </p:cNvSpPr>
+          <p:nvPr>
+            <p:ph type="title"/>
+          </p:nvPr>
+        </p:nvSpPr>
+        <p:spPr/>
+        <p:txBody>
+          <a:bodyPr/>
+          <a:lstStyle/>
+          <a:p>
+            <a:r>
+              <a:rPr lang="en-IN" dirty="0"/>
+              <a:t>Steps</a:t>
+            </a:r>
+          </a:p>
+        </p:txBody>
+      </p:sp>
+      <p:sp>
+        <p:nvSpPr>
+          <p:cNvPr id="3" name="Content Placeholder 2">
+            <a:extLst>
+              <a:ext uri="{FF2B5EF4-FFF2-40B4-BE49-F238E27FC236}">
+                <a16:creationId xmlns:a16="http://schemas.microsoft.com/office/drawing/2014/main" id="{F21AD78C-67A6-4FF2-8471-14E774617BE7}"/>
+              </a:ext>
+            </a:extLst>
+          </p:cNvPr>
+          <p:cNvSpPr>
+            <a:spLocks noGrp="1"/>
+          </p:cNvSpPr>
+          <p:nvPr>
+            <p:ph idx="1"/>
+          </p:nvPr>
+        </p:nvSpPr>
+        <p:spPr/>
+        <p:txBody>
+          <a:bodyPr/>
+          <a:lstStyle/>
+          <a:p>
+            <a:r>
+              <a:rPr lang="en-US" dirty="0"/>
+              <a:t>Create Blog Website (name the project as per your discretion)</a:t>
+            </a:r>
+          </a:p>
+          <a:p>
+            <a:r>
+              <a:rPr lang="en-US" dirty="0"/>
+              <a:t>Create the below mentioned views</a:t>
+            </a:r>
+          </a:p>
+          <a:p>
+            <a:pPr lvl="1"/>
+            <a:r>
+              <a:rPr lang="en-US" dirty="0" err="1"/>
+              <a:t>starting_page</a:t>
+            </a:r>
+            <a:r>
+              <a:rPr lang="en-US" dirty="0"/>
+              <a:t> : This will be the index page, which shall display the latest post</a:t>
+            </a:r>
+          </a:p>
+          <a:p>
+            <a:pPr lvl="1"/>
+            <a:r>
+              <a:rPr lang="en-US" dirty="0"/>
+              <a:t>posts : Display all the posts, which shall display all the post</a:t>
+            </a:r>
+          </a:p>
+          <a:p>
+            <a:pPr lvl="1"/>
+            <a:r>
+              <a:rPr lang="en-US" dirty="0" err="1"/>
+              <a:t>post_detail</a:t>
+            </a:r>
+            <a:r>
+              <a:rPr lang="en-US" dirty="0"/>
+              <a:t> : Display the content for a given post, which shall display a given post</a:t>
+            </a:r>
+          </a:p>
+          <a:p>
+            <a:r>
+              <a:rPr lang="en-US" dirty="0"/>
+              <a:t>URLs Mapping should be mentioned as below</a:t>
+            </a:r>
+          </a:p>
+          <a:p>
+            <a:pPr lvl="1"/>
+            <a:r>
+              <a:rPr lang="en-US" dirty="0"/>
+              <a:t>127.0.0.1:8000/ -&gt; </a:t>
+            </a:r>
+            <a:r>
+              <a:rPr lang="en-US" dirty="0" err="1"/>
+              <a:t>view.starting_page</a:t>
+            </a:r>
+            <a:endParaRPr lang="en-US" dirty="0"/>
+          </a:p>
+          <a:p>
+            <a:pPr lvl="1"/>
+            <a:r>
+              <a:rPr lang="en-US" dirty="0"/>
+              <a:t>127.0.0.1:8000/posts -&gt; </a:t>
+            </a:r>
+            <a:r>
+              <a:rPr lang="en-US" dirty="0" err="1"/>
+              <a:t>view.posts</a:t>
+            </a:r>
+            <a:endParaRPr lang="en-US" dirty="0"/>
+          </a:p>
+          <a:p>
+            <a:pPr lvl="1"/>
+            <a:r>
+              <a:rPr lang="en-US" dirty="0"/>
+              <a:t>127.0.0.1:8000/posts/&lt;</a:t>
+            </a:r>
+            <a:r>
+              <a:rPr lang="en-US" dirty="0" err="1"/>
+              <a:t>slug:slug</a:t>
+            </a:r>
+            <a:r>
+              <a:rPr lang="en-US" dirty="0"/>
+              <a:t>&gt; -&gt; </a:t>
+            </a:r>
+            <a:r>
+              <a:rPr lang="en-US" dirty="0" err="1"/>
+              <a:t>view.post_detail</a:t>
+            </a:r>
+            <a:endParaRPr lang="en-IN" dirty="0"/>
+          </a:p>
+        </p:txBody>
+      </p:sp>
+    </p:spTree>
+    <p:extLst>
+      <p:ext uri="{BB962C8B-B14F-4D97-AF65-F5344CB8AC3E}">
+        <p14:creationId xmlns:p14="http://schemas.microsoft.com/office/powerpoint/2010/main" val="1875787344"/>
+      </p:ext>
+    </p:extLst>
+  </p:cSld>
+  <p:clrMapOvr>
+    <a:masterClrMapping/>
+  </p:clrMapOvr>
+</p:sld>
+</file>
+
+<file path=ppt/slides/slide93.xml><?xml version="1.0" encoding="utf-8"?>
+<p:sld xmlns:a="http://schemas.openxmlformats.org/drawingml/2006/main" xmlns:r="http://schemas.openxmlformats.org/officeDocument/2006/relationships" xmlns:p="http://schemas.openxmlformats.org/presentationml/2006/main">
+  <p:cSld>
+    <p:spTree>
+      <p:nvGrpSpPr>
+        <p:cNvPr id="1" name=""/>
+        <p:cNvGrpSpPr/>
+        <p:nvPr/>
+      </p:nvGrpSpPr>
+      <p:grpSpPr>
+        <a:xfrm>
+          <a:off x="0" y="0"/>
+          <a:ext cx="0" cy="0"/>
+          <a:chOff x="0" y="0"/>
+          <a:chExt cx="0" cy="0"/>
+        </a:xfrm>
+      </p:grpSpPr>
+      <p:sp>
+        <p:nvSpPr>
+          <p:cNvPr id="2" name="Title 1">
+            <a:extLst>
+              <a:ext uri="{FF2B5EF4-FFF2-40B4-BE49-F238E27FC236}">
+                <a16:creationId xmlns:a16="http://schemas.microsoft.com/office/drawing/2014/main" id="{8A36E5E4-B76C-4552-B764-E39309AEBFDA}"/>
+              </a:ext>
+            </a:extLst>
+          </p:cNvPr>
+          <p:cNvSpPr>
+            <a:spLocks noGrp="1"/>
+          </p:cNvSpPr>
+          <p:nvPr>
+            <p:ph type="title"/>
+          </p:nvPr>
+        </p:nvSpPr>
+        <p:spPr/>
+        <p:txBody>
+          <a:bodyPr/>
+          <a:lstStyle/>
+          <a:p>
+            <a:r>
+              <a:rPr lang="en-IN" dirty="0"/>
+              <a:t>Design</a:t>
+            </a:r>
+          </a:p>
+        </p:txBody>
+      </p:sp>
+      <p:sp>
+        <p:nvSpPr>
+          <p:cNvPr id="3" name="Content Placeholder 2">
+            <a:extLst>
+              <a:ext uri="{FF2B5EF4-FFF2-40B4-BE49-F238E27FC236}">
+                <a16:creationId xmlns:a16="http://schemas.microsoft.com/office/drawing/2014/main" id="{8B5FABAE-8196-492B-914D-1E5B32F1DA91}"/>
+              </a:ext>
+            </a:extLst>
+          </p:cNvPr>
+          <p:cNvSpPr>
+            <a:spLocks noGrp="1"/>
+          </p:cNvSpPr>
+          <p:nvPr>
+            <p:ph idx="1"/>
+          </p:nvPr>
+        </p:nvSpPr>
+        <p:spPr>
+          <a:xfrm>
+            <a:off x="677334" y="1585519"/>
+            <a:ext cx="8596668" cy="4957894"/>
+          </a:xfrm>
+        </p:spPr>
+        <p:txBody>
+          <a:bodyPr>
+            <a:normAutofit fontScale="92500" lnSpcReduction="10000"/>
+          </a:bodyPr>
+          <a:lstStyle/>
+          <a:p>
+            <a:r>
+              <a:rPr lang="en-IN" dirty="0"/>
+              <a:t>Index Page:</a:t>
+            </a:r>
+          </a:p>
+          <a:p>
+            <a:pPr lvl="1"/>
+            <a:r>
+              <a:rPr lang="en-IN" dirty="0"/>
+              <a:t>Should contain a header with links to the index page and all posts</a:t>
+            </a:r>
+          </a:p>
+          <a:p>
+            <a:pPr lvl="1"/>
+            <a:r>
+              <a:rPr lang="en-IN" dirty="0"/>
+              <a:t>Should contain the name, summary, date for latest blog</a:t>
+            </a:r>
+          </a:p>
+          <a:p>
+            <a:r>
+              <a:rPr lang="en-IN" dirty="0"/>
+              <a:t>All Posts Page:</a:t>
+            </a:r>
+          </a:p>
+          <a:p>
+            <a:pPr lvl="1"/>
+            <a:r>
+              <a:rPr lang="en-IN" dirty="0"/>
+              <a:t>Should contain a header with links to the index page and all posts</a:t>
+            </a:r>
+          </a:p>
+          <a:p>
+            <a:pPr lvl="1"/>
+            <a:r>
+              <a:rPr lang="en-IN" dirty="0"/>
+              <a:t>Should contain a list of all the post with the following value</a:t>
+            </a:r>
+          </a:p>
+          <a:p>
+            <a:pPr lvl="2"/>
+            <a:r>
+              <a:rPr lang="en-IN" dirty="0"/>
+              <a:t>Should contain the name, summary, date</a:t>
+            </a:r>
+          </a:p>
+          <a:p>
+            <a:pPr lvl="1"/>
+            <a:r>
+              <a:rPr lang="en-IN" dirty="0"/>
+              <a:t>Each post name should be a link clicking on which you should be redirected to the specific post page</a:t>
+            </a:r>
+          </a:p>
+          <a:p>
+            <a:r>
+              <a:rPr lang="en-IN" dirty="0"/>
+              <a:t>Specific Post Page:</a:t>
+            </a:r>
+          </a:p>
+          <a:p>
+            <a:pPr lvl="1"/>
+            <a:r>
+              <a:rPr lang="en-IN" dirty="0"/>
+              <a:t>Should contain a header with links to the index page and all posts</a:t>
+            </a:r>
+          </a:p>
+          <a:p>
+            <a:pPr lvl="1"/>
+            <a:r>
+              <a:rPr lang="en-IN" dirty="0"/>
+              <a:t>Should display all the details</a:t>
+            </a:r>
+          </a:p>
+          <a:p>
+            <a:pPr lvl="2"/>
+            <a:r>
+              <a:rPr lang="en-IN" dirty="0"/>
+              <a:t>Name</a:t>
+            </a:r>
+          </a:p>
+          <a:p>
+            <a:pPr lvl="2"/>
+            <a:r>
+              <a:rPr lang="en-IN" dirty="0"/>
+              <a:t>Content</a:t>
+            </a:r>
+          </a:p>
+          <a:p>
+            <a:pPr lvl="2"/>
+            <a:r>
+              <a:rPr lang="en-IN" dirty="0"/>
+              <a:t>Date</a:t>
+            </a:r>
+          </a:p>
+        </p:txBody>
+      </p:sp>
+    </p:spTree>
+    <p:extLst>
+      <p:ext uri="{BB962C8B-B14F-4D97-AF65-F5344CB8AC3E}">
+        <p14:creationId xmlns:p14="http://schemas.microsoft.com/office/powerpoint/2010/main" val="1173821749"/>
+      </p:ext>
+    </p:extLst>
+  </p:cSld>
+  <p:clrMapOvr>
+    <a:masterClrMapping/>
+  </p:clrMapOvr>
+</p:sld>
+</file>
+
+<file path=ppt/slides/slide94.xml><?xml version="1.0" encoding="utf-8"?>
+<p:sld xmlns:a="http://schemas.openxmlformats.org/drawingml/2006/main" xmlns:r="http://schemas.openxmlformats.org/officeDocument/2006/relationships" xmlns:p="http://schemas.openxmlformats.org/presentationml/2006/main">
+  <p:cSld>
+    <p:spTree>
+      <p:nvGrpSpPr>
+        <p:cNvPr id="1" name=""/>
+        <p:cNvGrpSpPr/>
+        <p:nvPr/>
+      </p:nvGrpSpPr>
+      <p:grpSpPr>
+        <a:xfrm>
+          <a:off x="0" y="0"/>
+          <a:ext cx="0" cy="0"/>
+          <a:chOff x="0" y="0"/>
+          <a:chExt cx="0" cy="0"/>
+        </a:xfrm>
+      </p:grpSpPr>
+      <p:sp>
+        <p:nvSpPr>
+          <p:cNvPr id="2" name="Title 1">
+            <a:extLst>
+              <a:ext uri="{FF2B5EF4-FFF2-40B4-BE49-F238E27FC236}">
+                <a16:creationId xmlns:a16="http://schemas.microsoft.com/office/drawing/2014/main" id="{0E1AD225-ADA1-4D5E-96BF-6C139E8DA8B5}"/>
+              </a:ext>
+            </a:extLst>
+          </p:cNvPr>
+          <p:cNvSpPr>
+            <a:spLocks noGrp="1"/>
+          </p:cNvSpPr>
+          <p:nvPr>
+            <p:ph type="title"/>
+          </p:nvPr>
+        </p:nvSpPr>
+        <p:spPr>
+          <a:xfrm>
+            <a:off x="677334" y="173373"/>
+            <a:ext cx="8596668" cy="808139"/>
+          </a:xfrm>
+        </p:spPr>
+        <p:txBody>
+          <a:bodyPr/>
+          <a:lstStyle/>
+          <a:p>
+            <a:r>
+              <a:rPr lang="en-IN" dirty="0"/>
+              <a:t>Sample Images</a:t>
+            </a:r>
+          </a:p>
+        </p:txBody>
+      </p:sp>
+      <p:sp>
+        <p:nvSpPr>
+          <p:cNvPr id="3" name="Content Placeholder 2">
+            <a:extLst>
+              <a:ext uri="{FF2B5EF4-FFF2-40B4-BE49-F238E27FC236}">
+                <a16:creationId xmlns:a16="http://schemas.microsoft.com/office/drawing/2014/main" id="{1EEA39C5-484C-49B7-9717-6AF4FB6A5957}"/>
+              </a:ext>
+            </a:extLst>
+          </p:cNvPr>
+          <p:cNvSpPr>
+            <a:spLocks noGrp="1"/>
+          </p:cNvSpPr>
+          <p:nvPr>
+            <p:ph idx="1"/>
+          </p:nvPr>
+        </p:nvSpPr>
+        <p:spPr>
+          <a:xfrm>
+            <a:off x="677334" y="1694577"/>
+            <a:ext cx="8596668" cy="4346786"/>
+          </a:xfrm>
+        </p:spPr>
+        <p:txBody>
+          <a:bodyPr/>
+          <a:lstStyle/>
+          <a:p>
+            <a:endParaRPr lang="en-IN" dirty="0"/>
+          </a:p>
+        </p:txBody>
+      </p:sp>
+      <p:pic>
+        <p:nvPicPr>
+          <p:cNvPr id="5" name="Picture 4">
+            <a:extLst>
+              <a:ext uri="{FF2B5EF4-FFF2-40B4-BE49-F238E27FC236}">
+                <a16:creationId xmlns:a16="http://schemas.microsoft.com/office/drawing/2014/main" id="{8C2FFD6E-9797-45F6-A838-B11D582E56B8}"/>
+              </a:ext>
+            </a:extLst>
+          </p:cNvPr>
+          <p:cNvPicPr>
+            <a:picLocks noChangeAspect="1"/>
+          </p:cNvPicPr>
+          <p:nvPr/>
+        </p:nvPicPr>
+        <p:blipFill>
+          <a:blip r:embed="rId2"/>
+          <a:stretch>
+            <a:fillRect/>
+          </a:stretch>
+        </p:blipFill>
+        <p:spPr>
+          <a:xfrm>
+            <a:off x="677334" y="940150"/>
+            <a:ext cx="7543877" cy="5744477"/>
+          </a:xfrm>
+          <a:prstGeom prst="rect">
+            <a:avLst/>
+          </a:prstGeom>
+        </p:spPr>
+      </p:pic>
+    </p:spTree>
+    <p:extLst>
+      <p:ext uri="{BB962C8B-B14F-4D97-AF65-F5344CB8AC3E}">
+        <p14:creationId xmlns:p14="http://schemas.microsoft.com/office/powerpoint/2010/main" val="2834450930"/>
+      </p:ext>
+    </p:extLst>
+  </p:cSld>
+  <p:clrMapOvr>
+    <a:masterClrMapping/>
+  </p:clrMapOvr>
+</p:sld>
+</file>
+
+<file path=ppt/slides/slide95.xml><?xml version="1.0" encoding="utf-8"?>
+<p:sld xmlns:a="http://schemas.openxmlformats.org/drawingml/2006/main" xmlns:r="http://schemas.openxmlformats.org/officeDocument/2006/relationships" xmlns:p="http://schemas.openxmlformats.org/presentationml/2006/main">
+  <p:cSld>
+    <p:spTree>
+      <p:nvGrpSpPr>
+        <p:cNvPr id="1" name=""/>
+        <p:cNvGrpSpPr/>
+        <p:nvPr/>
+      </p:nvGrpSpPr>
+      <p:grpSpPr>
+        <a:xfrm>
+          <a:off x="0" y="0"/>
+          <a:ext cx="0" cy="0"/>
+          <a:chOff x="0" y="0"/>
+          <a:chExt cx="0" cy="0"/>
+        </a:xfrm>
+      </p:grpSpPr>
+      <p:sp>
+        <p:nvSpPr>
+          <p:cNvPr id="2" name="Title 1">
+            <a:extLst>
+              <a:ext uri="{FF2B5EF4-FFF2-40B4-BE49-F238E27FC236}">
+                <a16:creationId xmlns:a16="http://schemas.microsoft.com/office/drawing/2014/main" id="{F48FD891-7427-4F54-9EF2-9ECB3FD73DA1}"/>
+              </a:ext>
+            </a:extLst>
+          </p:cNvPr>
+          <p:cNvSpPr>
+            <a:spLocks noGrp="1"/>
+          </p:cNvSpPr>
+          <p:nvPr>
+            <p:ph type="title"/>
+          </p:nvPr>
+        </p:nvSpPr>
+        <p:spPr>
+          <a:xfrm>
+            <a:off x="677334" y="348144"/>
+            <a:ext cx="8596668" cy="799750"/>
+          </a:xfrm>
+        </p:spPr>
+        <p:txBody>
+          <a:bodyPr/>
+          <a:lstStyle/>
+          <a:p>
+            <a:r>
+              <a:rPr lang="en-IN" dirty="0"/>
+              <a:t>Sample All Post Page</a:t>
+            </a:r>
+          </a:p>
+        </p:txBody>
+      </p:sp>
+      <p:sp>
+        <p:nvSpPr>
+          <p:cNvPr id="3" name="Content Placeholder 2">
+            <a:extLst>
+              <a:ext uri="{FF2B5EF4-FFF2-40B4-BE49-F238E27FC236}">
+                <a16:creationId xmlns:a16="http://schemas.microsoft.com/office/drawing/2014/main" id="{C972C9C8-4B22-4F68-8B44-FB3CB16D5F0F}"/>
+              </a:ext>
+            </a:extLst>
+          </p:cNvPr>
+          <p:cNvSpPr>
+            <a:spLocks noGrp="1"/>
+          </p:cNvSpPr>
+          <p:nvPr>
+            <p:ph idx="1"/>
+          </p:nvPr>
+        </p:nvSpPr>
+        <p:spPr>
+          <a:xfrm>
+            <a:off x="677334" y="1409351"/>
+            <a:ext cx="8596668" cy="4632012"/>
+          </a:xfrm>
+        </p:spPr>
+        <p:txBody>
+          <a:bodyPr/>
+          <a:lstStyle/>
+          <a:p>
+            <a:endParaRPr lang="en-IN" dirty="0"/>
+          </a:p>
+        </p:txBody>
+      </p:sp>
+      <p:pic>
+        <p:nvPicPr>
+          <p:cNvPr id="5" name="Picture 4">
+            <a:extLst>
+              <a:ext uri="{FF2B5EF4-FFF2-40B4-BE49-F238E27FC236}">
+                <a16:creationId xmlns:a16="http://schemas.microsoft.com/office/drawing/2014/main" id="{47F4A08D-91F8-4853-A4EA-6A5DD8FDB82B}"/>
+              </a:ext>
+            </a:extLst>
+          </p:cNvPr>
+          <p:cNvPicPr>
+            <a:picLocks noChangeAspect="1"/>
+          </p:cNvPicPr>
+          <p:nvPr/>
+        </p:nvPicPr>
+        <p:blipFill>
+          <a:blip r:embed="rId2"/>
+          <a:stretch>
+            <a:fillRect/>
+          </a:stretch>
+        </p:blipFill>
+        <p:spPr>
+          <a:xfrm>
+            <a:off x="677334" y="1300293"/>
+            <a:ext cx="6981947" cy="5209563"/>
+          </a:xfrm>
+          <a:prstGeom prst="rect">
+            <a:avLst/>
+          </a:prstGeom>
+        </p:spPr>
+      </p:pic>
+    </p:spTree>
+    <p:extLst>
+      <p:ext uri="{BB962C8B-B14F-4D97-AF65-F5344CB8AC3E}">
+        <p14:creationId xmlns:p14="http://schemas.microsoft.com/office/powerpoint/2010/main" val="116459118"/>
       </p:ext>
     </p:extLst>
   </p:cSld>

</xml_diff>